<commit_message>
Session 1 notes update
</commit_message>
<xml_diff>
--- a/Chanco_STA6206_BDA_2019_Henrion_Session1.pptx
+++ b/Chanco_STA6206_BDA_2019_Henrion_Session1.pptx
@@ -11449,18 +11449,6 @@
               </a:p>
               <a:p>
                 <a:pPr lvl="0" marL="0" indent="0">
-                  <a:spcBef>
-                    <a:spcPts val="3000"/>
-                  </a:spcBef>
-                  <a:buNone/>
-                </a:pPr>
-                <a:r>
-                  <a:rPr b="1"/>
-                  <a:t>Random variables: probability distribution</a:t>
-                </a:r>
-              </a:p>
-              <a:p>
-                <a:pPr lvl="0" marL="0" indent="0">
                   <a:buNone/>
                 </a:pPr>
                 <a:r>
@@ -14765,13 +14753,22 @@
                     <m:r>
                       <m:t>→</m:t>
                     </m:r>
-                    <m:r>
-                      <m:rPr>
-                        <m:sty m:val="p"/>
-                        <m:scr m:val="double-struck"/>
-                      </m:rPr>
-                      <m:t>R</m:t>
-                    </m:r>
+                    <m:sSub>
+                      <m:e>
+                        <m:r>
+                          <m:rPr>
+                            <m:sty m:val="p"/>
+                            <m:scr m:val="double-struck"/>
+                          </m:rPr>
+                          <m:t>R</m:t>
+                        </m:r>
+                      </m:e>
+                      <m:sub>
+                        <m:r>
+                          <m:t>+</m:t>
+                        </m:r>
+                      </m:sub>
+                    </m:sSub>
                   </m:oMath>
                 </a14:m>
                 <a:r>
@@ -14785,7 +14782,55 @@
                 </a:pPr>
                 <a:r>
                   <a:rPr/>
-                  <a:t>Discrete case:</a:t>
+                  <a:t>Discrete case (in this case: </a:t>
+                </a:r>
+                <a14:m>
+                  <m:oMath xmlns:m="http://schemas.openxmlformats.org/officeDocument/2006/math">
+                    <m:r>
+                      <m:t>p</m:t>
+                    </m:r>
+                    <m:r>
+                      <m:t>:</m:t>
+                    </m:r>
+                    <m:sSup>
+                      <m:e>
+                        <m:r>
+                          <m:rPr>
+                            <m:sty m:val="p"/>
+                            <m:scr m:val="double-struck"/>
+                          </m:rPr>
+                          <m:t>R</m:t>
+                        </m:r>
+                      </m:e>
+                      <m:sup>
+                        <m:r>
+                          <m:t>2</m:t>
+                        </m:r>
+                      </m:sup>
+                    </m:sSup>
+                    <m:r>
+                      <m:t>→</m:t>
+                    </m:r>
+                    <m:r>
+                      <m:t>[</m:t>
+                    </m:r>
+                    <m:r>
+                      <m:t>0</m:t>
+                    </m:r>
+                    <m:r>
+                      <m:t>,</m:t>
+                    </m:r>
+                    <m:r>
+                      <m:t>1</m:t>
+                    </m:r>
+                    <m:r>
+                      <m:t>]</m:t>
+                    </m:r>
+                  </m:oMath>
+                </a14:m>
+                <a:r>
+                  <a:rPr/>
+                  <a:t>):</a:t>
                 </a:r>
               </a:p>
               <a:p>
@@ -16792,7 +16837,7 @@
                       </m:e>
                       <m:sub>
                         <m:r>
-                          <m:t>i</m:t>
+                          <m:t>1</m:t>
                         </m:r>
                       </m:sub>
                     </m:sSub>

</xml_diff>